<commit_message>
Transferred file to other folder
</commit_message>
<xml_diff>
--- a/10 - Spanning Tree/Spanning Tree Algorithms.pptx
+++ b/10 - Spanning Tree/Spanning Tree Algorithms.pptx
@@ -248,7 +248,7 @@
           <a:p>
             <a:fld id="{F666E1FD-E7A0-497B-BBC0-740BAAC97C64}" type="datetimeFigureOut">
               <a:rPr lang="en-PH" smtClean="0"/>
-              <a:t>27/10/2022</a:t>
+              <a:t>16/10/2023</a:t>
             </a:fld>
             <a:endParaRPr lang="en-PH"/>
           </a:p>
@@ -1841,7 +1841,7 @@
           <a:p>
             <a:fld id="{0CCF0B81-6BD8-4C65-9459-815598C5F1F4}" type="datetimeFigureOut">
               <a:rPr lang="en-PH" smtClean="0"/>
-              <a:t>27/10/2022</a:t>
+              <a:t>16/10/2023</a:t>
             </a:fld>
             <a:endParaRPr lang="en-PH"/>
           </a:p>
@@ -2041,7 +2041,7 @@
           <a:p>
             <a:fld id="{0CCF0B81-6BD8-4C65-9459-815598C5F1F4}" type="datetimeFigureOut">
               <a:rPr lang="en-PH" smtClean="0"/>
-              <a:t>27/10/2022</a:t>
+              <a:t>16/10/2023</a:t>
             </a:fld>
             <a:endParaRPr lang="en-PH"/>
           </a:p>
@@ -2251,7 +2251,7 @@
           <a:p>
             <a:fld id="{0CCF0B81-6BD8-4C65-9459-815598C5F1F4}" type="datetimeFigureOut">
               <a:rPr lang="en-PH" smtClean="0"/>
-              <a:t>27/10/2022</a:t>
+              <a:t>16/10/2023</a:t>
             </a:fld>
             <a:endParaRPr lang="en-PH"/>
           </a:p>
@@ -2451,7 +2451,7 @@
           <a:p>
             <a:fld id="{0CCF0B81-6BD8-4C65-9459-815598C5F1F4}" type="datetimeFigureOut">
               <a:rPr lang="en-PH" smtClean="0"/>
-              <a:t>27/10/2022</a:t>
+              <a:t>16/10/2023</a:t>
             </a:fld>
             <a:endParaRPr lang="en-PH"/>
           </a:p>
@@ -2727,7 +2727,7 @@
           <a:p>
             <a:fld id="{0CCF0B81-6BD8-4C65-9459-815598C5F1F4}" type="datetimeFigureOut">
               <a:rPr lang="en-PH" smtClean="0"/>
-              <a:t>27/10/2022</a:t>
+              <a:t>16/10/2023</a:t>
             </a:fld>
             <a:endParaRPr lang="en-PH"/>
           </a:p>
@@ -2995,7 +2995,7 @@
           <a:p>
             <a:fld id="{0CCF0B81-6BD8-4C65-9459-815598C5F1F4}" type="datetimeFigureOut">
               <a:rPr lang="en-PH" smtClean="0"/>
-              <a:t>27/10/2022</a:t>
+              <a:t>16/10/2023</a:t>
             </a:fld>
             <a:endParaRPr lang="en-PH"/>
           </a:p>
@@ -3410,7 +3410,7 @@
           <a:p>
             <a:fld id="{0CCF0B81-6BD8-4C65-9459-815598C5F1F4}" type="datetimeFigureOut">
               <a:rPr lang="en-PH" smtClean="0"/>
-              <a:t>27/10/2022</a:t>
+              <a:t>16/10/2023</a:t>
             </a:fld>
             <a:endParaRPr lang="en-PH"/>
           </a:p>
@@ -3552,7 +3552,7 @@
           <a:p>
             <a:fld id="{0CCF0B81-6BD8-4C65-9459-815598C5F1F4}" type="datetimeFigureOut">
               <a:rPr lang="en-PH" smtClean="0"/>
-              <a:t>27/10/2022</a:t>
+              <a:t>16/10/2023</a:t>
             </a:fld>
             <a:endParaRPr lang="en-PH"/>
           </a:p>
@@ -3665,7 +3665,7 @@
           <a:p>
             <a:fld id="{0CCF0B81-6BD8-4C65-9459-815598C5F1F4}" type="datetimeFigureOut">
               <a:rPr lang="en-PH" smtClean="0"/>
-              <a:t>27/10/2022</a:t>
+              <a:t>16/10/2023</a:t>
             </a:fld>
             <a:endParaRPr lang="en-PH"/>
           </a:p>
@@ -3978,7 +3978,7 @@
           <a:p>
             <a:fld id="{0CCF0B81-6BD8-4C65-9459-815598C5F1F4}" type="datetimeFigureOut">
               <a:rPr lang="en-PH" smtClean="0"/>
-              <a:t>27/10/2022</a:t>
+              <a:t>16/10/2023</a:t>
             </a:fld>
             <a:endParaRPr lang="en-PH"/>
           </a:p>
@@ -4267,7 +4267,7 @@
           <a:p>
             <a:fld id="{0CCF0B81-6BD8-4C65-9459-815598C5F1F4}" type="datetimeFigureOut">
               <a:rPr lang="en-PH" smtClean="0"/>
-              <a:t>27/10/2022</a:t>
+              <a:t>16/10/2023</a:t>
             </a:fld>
             <a:endParaRPr lang="en-PH"/>
           </a:p>
@@ -4510,7 +4510,7 @@
           <a:p>
             <a:fld id="{0CCF0B81-6BD8-4C65-9459-815598C5F1F4}" type="datetimeFigureOut">
               <a:rPr lang="en-PH" smtClean="0"/>
-              <a:t>27/10/2022</a:t>
+              <a:t>16/10/2023</a:t>
             </a:fld>
             <a:endParaRPr lang="en-PH"/>
           </a:p>
@@ -4990,33 +4990,53 @@
         </p:nvSpPr>
         <p:spPr/>
         <p:txBody>
-          <a:bodyPr/>
+          <a:bodyPr>
+            <a:normAutofit lnSpcReduction="10000"/>
+          </a:bodyPr>
           <a:lstStyle/>
-          <a:p>
-            <a:pPr algn="l"/>
-            <a:endParaRPr lang="en-PH" sz="2000" dirty="0"/>
-          </a:p>
           <a:p>
             <a:pPr algn="l"/>
             <a:r>
-              <a:rPr lang="en-PH" sz="2000" dirty="0"/>
+              <a:rPr lang="en-PH" sz="2400" b="1" dirty="0"/>
               <a:t>Presented by:</a:t>
             </a:r>
           </a:p>
           <a:p>
             <a:pPr algn="l"/>
             <a:r>
-              <a:rPr lang="en-PH" sz="2000" dirty="0" err="1"/>
+              <a:rPr lang="en-PH" sz="2400" dirty="0" err="1"/>
               <a:t>Elizer</a:t>
             </a:r>
             <a:r>
-              <a:rPr lang="en-PH" sz="2000" dirty="0"/>
-              <a:t> Ponio Jr</a:t>
+              <a:rPr lang="en-PH" sz="2400" dirty="0"/>
+              <a:t> </a:t>
             </a:r>
             <a:r>
-              <a:rPr lang="en-PH" dirty="0"/>
-              <a:t>.</a:t>
+              <a:rPr lang="en-PH" sz="2400" dirty="0" err="1"/>
+              <a:t>Ponio</a:t>
             </a:r>
+            <a:r>
+              <a:rPr lang="en-PH" sz="2400" dirty="0"/>
+              <a:t> Jr.</a:t>
+            </a:r>
+          </a:p>
+          <a:p>
+            <a:pPr algn="l"/>
+            <a:r>
+              <a:rPr lang="en-PH" sz="2400" dirty="0"/>
+              <a:t>Department of Computer Science</a:t>
+            </a:r>
+          </a:p>
+          <a:p>
+            <a:pPr algn="l"/>
+            <a:r>
+              <a:rPr lang="en-PH" sz="2400"/>
+              <a:t>College of Computing and Information Technologies</a:t>
+            </a:r>
+          </a:p>
+          <a:p>
+            <a:pPr algn="l"/>
+            <a:endParaRPr lang="en-PH" dirty="0"/>
           </a:p>
         </p:txBody>
       </p:sp>
@@ -5060,7 +5080,7 @@
                   <a:schemeClr val="tx1"/>
                 </a:solidFill>
               </a:rPr>
-              <a:t>CCDATRCL-INF214</a:t>
+              <a:t>CCDATRCL</a:t>
             </a:r>
           </a:p>
         </p:txBody>
@@ -5186,7 +5206,7 @@
                 </a:solidFill>
                 <a:latin typeface="+mj-lt"/>
               </a:rPr>
-              <a:t>CCDATRCL-INF214</a:t>
+              <a:t>CCDATRCL</a:t>
             </a:r>
           </a:p>
         </p:txBody>
@@ -8447,7 +8467,7 @@
                 </a:solidFill>
                 <a:latin typeface="+mj-lt"/>
               </a:rPr>
-              <a:t>CCDATRCL-INF214</a:t>
+              <a:t>CCDATRCL</a:t>
             </a:r>
           </a:p>
         </p:txBody>
@@ -9715,7 +9735,7 @@
                 </a:solidFill>
                 <a:latin typeface="+mj-lt"/>
               </a:rPr>
-              <a:t>CCDATRCL-INF214</a:t>
+              <a:t>CCDATRCL</a:t>
             </a:r>
           </a:p>
         </p:txBody>
@@ -9911,7 +9931,7 @@
                 </a:solidFill>
                 <a:latin typeface="+mj-lt"/>
               </a:rPr>
-              <a:t>CCDATRCL-INF214</a:t>
+              <a:t>CCDATRCL</a:t>
             </a:r>
           </a:p>
         </p:txBody>
@@ -13985,7 +14005,7 @@
                 </a:solidFill>
                 <a:latin typeface="+mj-lt"/>
               </a:rPr>
-              <a:t>CCDATRCL-INF214</a:t>
+              <a:t>CCDATRCL</a:t>
             </a:r>
           </a:p>
         </p:txBody>
@@ -14994,7 +15014,7 @@
                   <a:schemeClr val="tx1"/>
                 </a:solidFill>
               </a:rPr>
-              <a:t>CCDATRCL-INF214</a:t>
+              <a:t>CCDATRCL</a:t>
             </a:r>
           </a:p>
         </p:txBody>
@@ -15811,7 +15831,7 @@
                   <a:schemeClr val="tx1"/>
                 </a:solidFill>
               </a:rPr>
-              <a:t>CCDATRCL-INF214</a:t>
+              <a:t>CCDATRCL</a:t>
             </a:r>
           </a:p>
         </p:txBody>
@@ -21763,7 +21783,7 @@
                   <a:schemeClr val="tx1"/>
                 </a:solidFill>
               </a:rPr>
-              <a:t>CCDATRCL-INF214</a:t>
+              <a:t>CCDATRCL</a:t>
             </a:r>
           </a:p>
         </p:txBody>
@@ -22645,7 +22665,7 @@
                   <a:schemeClr val="tx1"/>
                 </a:solidFill>
               </a:rPr>
-              <a:t>CCDATRCL-INF214</a:t>
+              <a:t>CCDATRCL</a:t>
             </a:r>
           </a:p>
         </p:txBody>
@@ -28518,7 +28538,7 @@
                   <a:schemeClr val="tx1"/>
                 </a:solidFill>
               </a:rPr>
-              <a:t>CCDATRCL-INF214</a:t>
+              <a:t>CCDATRCL</a:t>
             </a:r>
           </a:p>
         </p:txBody>
@@ -29104,7 +29124,7 @@
                   <a:schemeClr val="tx1"/>
                 </a:solidFill>
               </a:rPr>
-              <a:t>CCDATRCL-INF214</a:t>
+              <a:t>CCDATRCL</a:t>
             </a:r>
           </a:p>
         </p:txBody>
@@ -29540,7 +29560,7 @@
                   <a:schemeClr val="tx1"/>
                 </a:solidFill>
               </a:rPr>
-              <a:t>CCDATRCL-INF214</a:t>
+              <a:t>CCDATRCL</a:t>
             </a:r>
           </a:p>
         </p:txBody>
@@ -29881,7 +29901,7 @@
                 </a:solidFill>
                 <a:latin typeface="+mj-lt"/>
               </a:rPr>
-              <a:t>CCDATRCL-INF214</a:t>
+              <a:t>CCDATRCL</a:t>
             </a:r>
           </a:p>
         </p:txBody>
@@ -30560,21 +30580,6 @@
 </file>
 
 <file path=customXml/item1.xml><?xml version="1.0" encoding="utf-8"?>
-<p:properties xmlns:p="http://schemas.microsoft.com/office/2006/metadata/properties" xmlns:xsi="http://www.w3.org/2001/XMLSchema-instance" xmlns:pc="http://schemas.microsoft.com/office/infopath/2007/PartnerControls">
-  <documentManagement/>
-</p:properties>
-</file>
-
-<file path=customXml/item2.xml><?xml version="1.0" encoding="utf-8"?>
-<?mso-contentType ?>
-<FormTemplates xmlns="http://schemas.microsoft.com/sharepoint/v3/contenttype/forms">
-  <Display>DocumentLibraryForm</Display>
-  <Edit>DocumentLibraryForm</Edit>
-  <New>DocumentLibraryForm</New>
-</FormTemplates>
-</file>
-
-<file path=customXml/item3.xml><?xml version="1.0" encoding="utf-8"?>
 <ct:contentTypeSchema xmlns:ct="http://schemas.microsoft.com/office/2006/metadata/contentType" xmlns:ma="http://schemas.microsoft.com/office/2006/metadata/properties/metaAttributes" ct:_="" ma:_="" ma:contentTypeName="Document" ma:contentTypeID="0x0101007188BDCA587B344BBA6CB1A93FAE6998" ma:contentTypeVersion="2" ma:contentTypeDescription="Create a new document." ma:contentTypeScope="" ma:versionID="7a8e4b6720badb2566a0cfeddfaf2856">
   <xsd:schema xmlns:xsd="http://www.w3.org/2001/XMLSchema" xmlns:xs="http://www.w3.org/2001/XMLSchema" xmlns:p="http://schemas.microsoft.com/office/2006/metadata/properties" xmlns:ns2="ba111d12-426d-4af0-bcb6-460e36974645" targetNamespace="http://schemas.microsoft.com/office/2006/metadata/properties" ma:root="true" ma:fieldsID="989b05398519136c88ba0a8d54e3c3da" ns2:_="">
     <xsd:import namespace="ba111d12-426d-4af0-bcb6-460e36974645"/>
@@ -30706,24 +30711,22 @@
 </ct:contentTypeSchema>
 </file>
 
-<file path=customXml/itemProps1.xml><?xml version="1.0" encoding="utf-8"?>
-<ds:datastoreItem xmlns:ds="http://schemas.openxmlformats.org/officeDocument/2006/customXml" ds:itemID="{4B5B3AD9-9EA7-40FE-8BB9-78783032A867}">
-  <ds:schemaRefs>
-    <ds:schemaRef ds:uri="http://schemas.microsoft.com/office/2006/metadata/properties"/>
-    <ds:schemaRef ds:uri="http://schemas.microsoft.com/office/infopath/2007/PartnerControls"/>
-  </ds:schemaRefs>
-</ds:datastoreItem>
+<file path=customXml/item2.xml><?xml version="1.0" encoding="utf-8"?>
+<p:properties xmlns:p="http://schemas.microsoft.com/office/2006/metadata/properties" xmlns:xsi="http://www.w3.org/2001/XMLSchema-instance" xmlns:pc="http://schemas.microsoft.com/office/infopath/2007/PartnerControls">
+  <documentManagement/>
+</p:properties>
 </file>
 
-<file path=customXml/itemProps2.xml><?xml version="1.0" encoding="utf-8"?>
-<ds:datastoreItem xmlns:ds="http://schemas.openxmlformats.org/officeDocument/2006/customXml" ds:itemID="{39BF9FAA-0054-4EA2-9DC5-D71FA65056C4}">
-  <ds:schemaRefs>
-    <ds:schemaRef ds:uri="http://schemas.microsoft.com/sharepoint/v3/contenttype/forms"/>
-  </ds:schemaRefs>
-</ds:datastoreItem>
+<file path=customXml/item3.xml><?xml version="1.0" encoding="utf-8"?>
+<?mso-contentType ?>
+<FormTemplates xmlns="http://schemas.microsoft.com/sharepoint/v3/contenttype/forms">
+  <Display>DocumentLibraryForm</Display>
+  <Edit>DocumentLibraryForm</Edit>
+  <New>DocumentLibraryForm</New>
+</FormTemplates>
 </file>
 
-<file path=customXml/itemProps3.xml><?xml version="1.0" encoding="utf-8"?>
+<file path=customXml/itemProps1.xml><?xml version="1.0" encoding="utf-8"?>
 <ds:datastoreItem xmlns:ds="http://schemas.openxmlformats.org/officeDocument/2006/customXml" ds:itemID="{878C37DF-16F5-4A6B-B405-79CF70B32B90}">
   <ds:schemaRefs>
     <ds:schemaRef ds:uri="http://schemas.microsoft.com/office/2006/metadata/contentType"/>
@@ -30739,4 +30742,21 @@
     <ds:schemaRef ds:uri="http://schemas.microsoft.com/internal/obd"/>
   </ds:schemaRefs>
 </ds:datastoreItem>
+</file>
+
+<file path=customXml/itemProps2.xml><?xml version="1.0" encoding="utf-8"?>
+<ds:datastoreItem xmlns:ds="http://schemas.openxmlformats.org/officeDocument/2006/customXml" ds:itemID="{4B5B3AD9-9EA7-40FE-8BB9-78783032A867}">
+  <ds:schemaRefs>
+    <ds:schemaRef ds:uri="http://schemas.microsoft.com/office/2006/metadata/properties"/>
+    <ds:schemaRef ds:uri="http://schemas.microsoft.com/office/infopath/2007/PartnerControls"/>
+  </ds:schemaRefs>
+</ds:datastoreItem>
+</file>
+
+<file path=customXml/itemProps3.xml><?xml version="1.0" encoding="utf-8"?>
+<ds:datastoreItem xmlns:ds="http://schemas.openxmlformats.org/officeDocument/2006/customXml" ds:itemID="{39BF9FAA-0054-4EA2-9DC5-D71FA65056C4}">
+  <ds:schemaRefs>
+    <ds:schemaRef ds:uri="http://schemas.microsoft.com/sharepoint/v3/contenttype/forms"/>
+  </ds:schemaRefs>
+</ds:datastoreItem>
 </file>
</xml_diff>